<commit_message>
Added option for turning off parsing.
</commit_message>
<xml_diff>
--- a/project_management/open_meetings/ICR_WS_Meeting_2011_02_09.pptx
+++ b/project_management/open_meetings/ICR_WS_Meeting_2011_02_09.pptx
@@ -230,7 +230,7 @@
             <a:fld id="{19C1E9F1-3EC1-6444-B428-4F8E6DCDED3B}" type="datetimeFigureOut">
               <a:rPr lang="en-US" smtClean="0"/>
               <a:pPr/>
-              <a:t>2/8/11</a:t>
+              <a:t>2/9/11</a:t>
             </a:fld>
             <a:endParaRPr lang="en-US"/>
           </a:p>
@@ -3475,12 +3475,6 @@
               </a:rPr>
               <a:t>caArray Update:</a:t>
             </a:r>
-            <a:r>
-              <a:rPr lang="en-US" dirty="0" smtClean="0">
-                <a:ea typeface="ＭＳ Ｐゴシック" charset="-128"/>
-              </a:rPr>
-              <a:t/>
-            </a:r>
             <a:br>
               <a:rPr lang="en-US" dirty="0" smtClean="0">
                 <a:ea typeface="ＭＳ Ｐゴシック" charset="-128"/>
@@ -3563,16 +3557,6 @@
                 <a:ea typeface="ＭＳ Ｐゴシック" charset="-128"/>
               </a:rPr>
               <a:t>ICR-WS Meeting</a:t>
-            </a:r>
-            <a:r>
-              <a:rPr lang="en-US" sz="1400" dirty="0" smtClean="0">
-                <a:solidFill>
-                  <a:schemeClr val="bg2"/>
-                </a:solidFill>
-                <a:latin typeface="Arial" charset="0"/>
-                <a:ea typeface="ＭＳ Ｐゴシック" charset="-128"/>
-              </a:rPr>
-              <a:t/>
             </a:r>
             <a:br>
               <a:rPr lang="en-US" sz="1400" dirty="0" smtClean="0">
@@ -3751,11 +3735,7 @@
             <a:pPr lvl="1" eaLnBrk="1" hangingPunct="1"/>
             <a:r>
               <a:rPr lang="en-US" sz="1600" dirty="0" smtClean="0"/>
-              <a:t>Supports N/A values in copy number </a:t>
-            </a:r>
-            <a:r>
-              <a:rPr lang="en-US" sz="1600" dirty="0" smtClean="0"/>
-              <a:t>data</a:t>
+              <a:t>Supports N/A values in copy number data</a:t>
             </a:r>
           </a:p>
           <a:p>
@@ -3764,7 +3744,6 @@
               <a:rPr lang="en-US" sz="1600" dirty="0" smtClean="0"/>
               <a:t>Fixes problems with upgrade installers</a:t>
             </a:r>
-            <a:endParaRPr lang="en-US" sz="1600" dirty="0" smtClean="0"/>
           </a:p>
           <a:p>
             <a:pPr eaLnBrk="1" hangingPunct="1"/>
@@ -3777,31 +3756,14 @@
             <a:pPr lvl="1" eaLnBrk="1" hangingPunct="1"/>
             <a:r>
               <a:rPr lang="en-US" sz="1600" dirty="0" smtClean="0"/>
-              <a:t>S</a:t>
-            </a:r>
+              <a:t>Support easier import of large data sets without having to break them into batches</a:t>
+            </a:r>
+          </a:p>
+          <a:p>
+            <a:pPr lvl="1" eaLnBrk="1" hangingPunct="1"/>
             <a:r>
               <a:rPr lang="en-US" sz="1600" dirty="0" smtClean="0"/>
-              <a:t>upport easier import</a:t>
-            </a:r>
-            <a:r>
-              <a:rPr lang="en-US" sz="1600" dirty="0" smtClean="0"/>
-              <a:t> of large </a:t>
-            </a:r>
-            <a:r>
-              <a:rPr lang="en-US" sz="1600" dirty="0" smtClean="0"/>
-              <a:t>data sets without having to break them into batches</a:t>
-            </a:r>
-            <a:endParaRPr lang="en-US" sz="1600" dirty="0" smtClean="0"/>
-          </a:p>
-          <a:p>
-            <a:pPr lvl="1" eaLnBrk="1" hangingPunct="1"/>
-            <a:r>
-              <a:rPr lang="en-US" sz="1600" dirty="0" smtClean="0"/>
-              <a:t>Introduce </a:t>
-            </a:r>
-            <a:r>
-              <a:rPr lang="en-US" sz="1600" dirty="0" smtClean="0"/>
-              <a:t>a </a:t>
+              <a:t>Introduce a </a:t>
             </a:r>
             <a:r>
               <a:rPr lang="en-US" sz="1600" dirty="0" err="1" smtClean="0"/>
@@ -3811,7 +3773,6 @@
               <a:rPr lang="en-US" sz="1600" dirty="0" smtClean="0"/>
               <a:t> architecture that supports the addition of new parsers</a:t>
             </a:r>
-            <a:endParaRPr lang="en-US" sz="1600" dirty="0" smtClean="0"/>
           </a:p>
           <a:p>
             <a:pPr lvl="1" eaLnBrk="1" hangingPunct="1"/>
@@ -3842,7 +3803,6 @@
               <a:rPr lang="en-US" sz="1600" dirty="0" smtClean="0"/>
               <a:t> 5.1, BDA 1.7, Java 6)</a:t>
             </a:r>
-            <a:endParaRPr lang="en-US" sz="1600" dirty="0" smtClean="0"/>
           </a:p>
         </p:txBody>
       </p:sp>
@@ -3895,17 +3855,8 @@
           <a:p>
             <a:r>
               <a:rPr lang="en-US" dirty="0" smtClean="0"/>
-              <a:t>Import of </a:t>
-            </a:r>
-            <a:r>
-              <a:rPr lang="en-US" dirty="0" smtClean="0"/>
-              <a:t>large</a:t>
-            </a:r>
-            <a:r>
-              <a:rPr lang="en-US" dirty="0" smtClean="0"/>
-              <a:t> data sets</a:t>
-            </a:r>
-            <a:endParaRPr lang="en-US" dirty="0" smtClean="0"/>
+              <a:t>Import of large data sets</a:t>
+            </a:r>
           </a:p>
         </p:txBody>
       </p:sp>
@@ -3928,7 +3879,6 @@
               <a:rPr lang="en-US" dirty="0" smtClean="0"/>
               <a:t>Features</a:t>
             </a:r>
-            <a:endParaRPr lang="en-US" dirty="0" smtClean="0"/>
           </a:p>
           <a:p>
             <a:pPr lvl="1"/>
@@ -3941,19 +3891,7 @@
             <a:pPr lvl="1"/>
             <a:r>
               <a:rPr lang="en-US" dirty="0" smtClean="0"/>
-              <a:t>Support</a:t>
-            </a:r>
-            <a:r>
-              <a:rPr lang="en-US" dirty="0" smtClean="0"/>
-              <a:t> future cloud </a:t>
-            </a:r>
-            <a:r>
-              <a:rPr lang="en-US" dirty="0" smtClean="0"/>
-              <a:t>storage of data files, allowing a local installer to configure this</a:t>
-            </a:r>
-            <a:r>
-              <a:rPr lang="en-US" dirty="0" smtClean="0"/>
-              <a:t>.</a:t>
+              <a:t>Support future cloud storage of data files, allowing a local installer to configure this.</a:t>
             </a:r>
           </a:p>
           <a:p>
@@ -4006,8 +3944,28 @@
             <a:pPr lvl="1"/>
             <a:r>
               <a:rPr lang="en-US" dirty="0" smtClean="0"/>
-              <a:t>Add better Import Queue management, including the ability to see the position of your import in the queue and the ability to cancel an import.</a:t>
-            </a:r>
+              <a:t>Add better Import Queue management, including the ability to see the position of your import in the queue and the ability to cancel an import</a:t>
+            </a:r>
+            <a:r>
+              <a:rPr lang="en-US" dirty="0" smtClean="0"/>
+              <a:t>.</a:t>
+            </a:r>
+          </a:p>
+          <a:p>
+            <a:pPr lvl="1"/>
+            <a:r>
+              <a:rPr lang="en-US" dirty="0" smtClean="0"/>
+              <a:t>Evaluate option </a:t>
+            </a:r>
+            <a:r>
+              <a:rPr lang="en-US" smtClean="0"/>
+              <a:t>of turning </a:t>
+            </a:r>
+            <a:r>
+              <a:rPr lang="en-US" dirty="0" smtClean="0"/>
+              <a:t>off parsing.</a:t>
+            </a:r>
+            <a:endParaRPr lang="en-US" dirty="0" smtClean="0"/>
           </a:p>
         </p:txBody>
       </p:sp>
@@ -4060,21 +4018,8 @@
           <a:p>
             <a:r>
               <a:rPr lang="en-US" dirty="0" smtClean="0"/>
-              <a:t>Upload</a:t>
-            </a:r>
-            <a:r>
-              <a:rPr lang="en-US" dirty="0" smtClean="0"/>
-              <a:t>/Download </a:t>
-            </a:r>
-            <a:r>
-              <a:rPr lang="en-US" dirty="0" smtClean="0"/>
-              <a:t>of large</a:t>
-            </a:r>
-            <a:r>
-              <a:rPr lang="en-US" dirty="0" smtClean="0"/>
-              <a:t> file sets</a:t>
-            </a:r>
-            <a:endParaRPr lang="en-US" dirty="0" smtClean="0"/>
+              <a:t>Upload/Download of large file sets</a:t>
+            </a:r>
           </a:p>
         </p:txBody>
       </p:sp>
@@ -4097,7 +4042,6 @@
               <a:rPr lang="en-US" dirty="0" smtClean="0"/>
               <a:t>Features</a:t>
             </a:r>
-            <a:endParaRPr lang="en-US" dirty="0" smtClean="0"/>
           </a:p>
           <a:p>
             <a:pPr lvl="1"/>
@@ -4111,21 +4055,8 @@
             </a:r>
             <a:r>
               <a:rPr lang="en-US" dirty="0" smtClean="0"/>
-              <a:t> up</a:t>
-            </a:r>
-            <a:r>
-              <a:rPr lang="en-US" dirty="0" smtClean="0"/>
-              <a:t>loads </a:t>
-            </a:r>
-            <a:r>
-              <a:rPr lang="en-US" dirty="0" smtClean="0"/>
-              <a:t>and transparent compression</a:t>
-            </a:r>
-            <a:r>
-              <a:rPr lang="en-US" dirty="0" smtClean="0"/>
-              <a:t>.</a:t>
-            </a:r>
-            <a:endParaRPr lang="en-US" dirty="0" smtClean="0"/>
+              <a:t> uploads and transparent compression.</a:t>
+            </a:r>
           </a:p>
         </p:txBody>
       </p:sp>
@@ -4206,19 +4137,7 @@
               <a:rPr lang="en-US" sz="2200" dirty="0" smtClean="0">
                 <a:ea typeface="ＭＳ Ｐゴシック" charset="-128"/>
               </a:rPr>
-              <a:t>We welcome f</a:t>
-            </a:r>
-            <a:r>
-              <a:rPr lang="en-US" sz="2200" dirty="0" smtClean="0">
-                <a:ea typeface="ＭＳ Ｐゴシック" charset="-128"/>
-              </a:rPr>
-              <a:t>eedback </a:t>
-            </a:r>
-            <a:r>
-              <a:rPr lang="en-US" sz="2200" dirty="0" smtClean="0">
-                <a:ea typeface="ＭＳ Ｐゴシック" charset="-128"/>
-              </a:rPr>
-              <a:t>on caArray</a:t>
+              <a:t>We welcome feedback on caArray</a:t>
             </a:r>
           </a:p>
           <a:p>

</xml_diff>

<commit_message>
added plugin and storage slides
</commit_message>
<xml_diff>
--- a/project_management/open_meetings/ICR_WS_Meeting_2011_02_09.pptx
+++ b/project_management/open_meetings/ICR_WS_Meeting_2011_02_09.pptx
@@ -5,17 +5,21 @@
     <p:sldMasterId id="2147483648" r:id="rId1"/>
   </p:sldMasterIdLst>
   <p:notesMasterIdLst>
-    <p:notesMasterId r:id="rId7"/>
+    <p:notesMasterId r:id="rId11"/>
   </p:notesMasterIdLst>
   <p:handoutMasterIdLst>
-    <p:handoutMasterId r:id="rId8"/>
+    <p:handoutMasterId r:id="rId12"/>
   </p:handoutMasterIdLst>
   <p:sldIdLst>
     <p:sldId id="264" r:id="rId2"/>
     <p:sldId id="334" r:id="rId3"/>
-    <p:sldId id="336" r:id="rId4"/>
-    <p:sldId id="337" r:id="rId5"/>
-    <p:sldId id="268" r:id="rId6"/>
+    <p:sldId id="338" r:id="rId4"/>
+    <p:sldId id="339" r:id="rId5"/>
+    <p:sldId id="340" r:id="rId6"/>
+    <p:sldId id="341" r:id="rId7"/>
+    <p:sldId id="336" r:id="rId8"/>
+    <p:sldId id="337" r:id="rId9"/>
+    <p:sldId id="268" r:id="rId10"/>
   </p:sldIdLst>
   <p:sldSz cx="9144000" cy="6858000" type="screen4x3"/>
   <p:notesSz cx="6858000" cy="9144000"/>
@@ -1054,6 +1058,195 @@
 </file>
 
 <file path=ppt/notesSlides/notesSlide5.xml><?xml version="1.0" encoding="utf-8"?>
+<p:notes xmlns:a="http://schemas.openxmlformats.org/drawingml/2006/main" xmlns:r="http://schemas.openxmlformats.org/officeDocument/2006/relationships" xmlns:mc="http://schemas.openxmlformats.org/markup-compatibility/2006" xmlns:mv="urn:schemas-microsoft-com:mac:vml" xmlns:p="http://schemas.openxmlformats.org/presentationml/2006/main" mc:Ignorable="mv" mc:PreserveAttributes="mv:*">
+  <p:cSld>
+    <p:spTree>
+      <p:nvGrpSpPr>
+        <p:cNvPr id="1" name=""/>
+        <p:cNvGrpSpPr/>
+        <p:nvPr/>
+      </p:nvGrpSpPr>
+      <p:grpSpPr>
+        <a:xfrm>
+          <a:off x="0" y="0"/>
+          <a:ext cx="0" cy="0"/>
+          <a:chOff x="0" y="0"/>
+          <a:chExt cx="0" cy="0"/>
+        </a:xfrm>
+      </p:grpSpPr>
+      <p:sp>
+        <p:nvSpPr>
+          <p:cNvPr id="101378" name="Rectangle 2"/>
+          <p:cNvSpPr>
+            <a:spLocks noGrp="1" noRot="1" noChangeAspect="1" noChangeArrowheads="1" noTextEdit="1"/>
+          </p:cNvSpPr>
+          <p:nvPr>
+            <p:ph type="sldImg"/>
+          </p:nvPr>
+        </p:nvSpPr>
+        <p:spPr>
+          <a:ln/>
+        </p:spPr>
+      </p:sp>
+      <p:sp>
+        <p:nvSpPr>
+          <p:cNvPr id="101379" name="Rectangle 3"/>
+          <p:cNvSpPr>
+            <a:spLocks noGrp="1" noChangeArrowheads="1"/>
+          </p:cNvSpPr>
+          <p:nvPr>
+            <p:ph type="body" idx="1"/>
+          </p:nvPr>
+        </p:nvSpPr>
+        <p:spPr>
+          <a:noFill/>
+          <a:ln/>
+        </p:spPr>
+        <p:txBody>
+          <a:bodyPr/>
+          <a:lstStyle/>
+          <a:p>
+            <a:endParaRPr lang="en-US" dirty="0" smtClean="0">
+              <a:ea typeface="ＭＳ Ｐゴシック" charset="-128"/>
+            </a:endParaRPr>
+          </a:p>
+        </p:txBody>
+      </p:sp>
+    </p:spTree>
+  </p:cSld>
+  <p:clrMapOvr>
+    <a:masterClrMapping/>
+  </p:clrMapOvr>
+</p:notes>
+</file>
+
+<file path=ppt/notesSlides/notesSlide6.xml><?xml version="1.0" encoding="utf-8"?>
+<p:notes xmlns:a="http://schemas.openxmlformats.org/drawingml/2006/main" xmlns:r="http://schemas.openxmlformats.org/officeDocument/2006/relationships" xmlns:mc="http://schemas.openxmlformats.org/markup-compatibility/2006" xmlns:mv="urn:schemas-microsoft-com:mac:vml" xmlns:p="http://schemas.openxmlformats.org/presentationml/2006/main" mc:Ignorable="mv" mc:PreserveAttributes="mv:*">
+  <p:cSld>
+    <p:spTree>
+      <p:nvGrpSpPr>
+        <p:cNvPr id="1" name=""/>
+        <p:cNvGrpSpPr/>
+        <p:nvPr/>
+      </p:nvGrpSpPr>
+      <p:grpSpPr>
+        <a:xfrm>
+          <a:off x="0" y="0"/>
+          <a:ext cx="0" cy="0"/>
+          <a:chOff x="0" y="0"/>
+          <a:chExt cx="0" cy="0"/>
+        </a:xfrm>
+      </p:grpSpPr>
+      <p:sp>
+        <p:nvSpPr>
+          <p:cNvPr id="101378" name="Rectangle 2"/>
+          <p:cNvSpPr>
+            <a:spLocks noGrp="1" noRot="1" noChangeAspect="1" noChangeArrowheads="1" noTextEdit="1"/>
+          </p:cNvSpPr>
+          <p:nvPr>
+            <p:ph type="sldImg"/>
+          </p:nvPr>
+        </p:nvSpPr>
+        <p:spPr>
+          <a:ln/>
+        </p:spPr>
+      </p:sp>
+      <p:sp>
+        <p:nvSpPr>
+          <p:cNvPr id="101379" name="Rectangle 3"/>
+          <p:cNvSpPr>
+            <a:spLocks noGrp="1" noChangeArrowheads="1"/>
+          </p:cNvSpPr>
+          <p:nvPr>
+            <p:ph type="body" idx="1"/>
+          </p:nvPr>
+        </p:nvSpPr>
+        <p:spPr>
+          <a:noFill/>
+          <a:ln/>
+        </p:spPr>
+        <p:txBody>
+          <a:bodyPr/>
+          <a:lstStyle/>
+          <a:p>
+            <a:endParaRPr lang="en-US" dirty="0" smtClean="0">
+              <a:ea typeface="ＭＳ Ｐゴシック" charset="-128"/>
+            </a:endParaRPr>
+          </a:p>
+        </p:txBody>
+      </p:sp>
+    </p:spTree>
+  </p:cSld>
+  <p:clrMapOvr>
+    <a:masterClrMapping/>
+  </p:clrMapOvr>
+</p:notes>
+</file>
+
+<file path=ppt/notesSlides/notesSlide7.xml><?xml version="1.0" encoding="utf-8"?>
+<p:notes xmlns:a="http://schemas.openxmlformats.org/drawingml/2006/main" xmlns:r="http://schemas.openxmlformats.org/officeDocument/2006/relationships" xmlns:mc="http://schemas.openxmlformats.org/markup-compatibility/2006" xmlns:mv="urn:schemas-microsoft-com:mac:vml" xmlns:p="http://schemas.openxmlformats.org/presentationml/2006/main" mc:Ignorable="mv" mc:PreserveAttributes="mv:*">
+  <p:cSld>
+    <p:spTree>
+      <p:nvGrpSpPr>
+        <p:cNvPr id="1" name=""/>
+        <p:cNvGrpSpPr/>
+        <p:nvPr/>
+      </p:nvGrpSpPr>
+      <p:grpSpPr>
+        <a:xfrm>
+          <a:off x="0" y="0"/>
+          <a:ext cx="0" cy="0"/>
+          <a:chOff x="0" y="0"/>
+          <a:chExt cx="0" cy="0"/>
+        </a:xfrm>
+      </p:grpSpPr>
+      <p:sp>
+        <p:nvSpPr>
+          <p:cNvPr id="101378" name="Rectangle 2"/>
+          <p:cNvSpPr>
+            <a:spLocks noGrp="1" noRot="1" noChangeAspect="1" noChangeArrowheads="1" noTextEdit="1"/>
+          </p:cNvSpPr>
+          <p:nvPr>
+            <p:ph type="sldImg"/>
+          </p:nvPr>
+        </p:nvSpPr>
+        <p:spPr>
+          <a:ln/>
+        </p:spPr>
+      </p:sp>
+      <p:sp>
+        <p:nvSpPr>
+          <p:cNvPr id="101379" name="Rectangle 3"/>
+          <p:cNvSpPr>
+            <a:spLocks noGrp="1" noChangeArrowheads="1"/>
+          </p:cNvSpPr>
+          <p:nvPr>
+            <p:ph type="body" idx="1"/>
+          </p:nvPr>
+        </p:nvSpPr>
+        <p:spPr>
+          <a:noFill/>
+          <a:ln/>
+        </p:spPr>
+        <p:txBody>
+          <a:bodyPr/>
+          <a:lstStyle/>
+          <a:p>
+            <a:endParaRPr lang="en-US" dirty="0" smtClean="0">
+              <a:ea typeface="ＭＳ Ｐゴシック" charset="-128"/>
+            </a:endParaRPr>
+          </a:p>
+        </p:txBody>
+      </p:sp>
+    </p:spTree>
+  </p:cSld>
+  <p:clrMapOvr>
+    <a:masterClrMapping/>
+  </p:clrMapOvr>
+</p:notes>
+</file>
+
+<file path=ppt/notesSlides/notesSlide8.xml><?xml version="1.0" encoding="utf-8"?>
 <p:notes xmlns:a="http://schemas.openxmlformats.org/drawingml/2006/main" xmlns:r="http://schemas.openxmlformats.org/officeDocument/2006/relationships" xmlns:mc="http://schemas.openxmlformats.org/markup-compatibility/2006" xmlns:mv="urn:schemas-microsoft-com:mac:vml" xmlns:p="http://schemas.openxmlformats.org/presentationml/2006/main" mc:Ignorable="mv" mc:PreserveAttributes="mv:*">
   <p:cSld>
     <p:spTree>
@@ -3845,7 +4038,7 @@
             <a:spLocks noGrp="1" noChangeArrowheads="1"/>
           </p:cNvSpPr>
           <p:nvPr>
-            <p:ph type="title"/>
+            <p:ph type="title" idx="4294967295"/>
           </p:nvPr>
         </p:nvSpPr>
         <p:spPr/>
@@ -3853,10 +4046,16 @@
           <a:bodyPr/>
           <a:lstStyle/>
           <a:p>
-            <a:r>
-              <a:rPr lang="en-US" dirty="0" smtClean="0"/>
-              <a:t>Import of large data sets</a:t>
-            </a:r>
+            <a:pPr eaLnBrk="1" hangingPunct="1"/>
+            <a:r>
+              <a:rPr lang="en-US" dirty="0" smtClean="0">
+                <a:ea typeface="ＭＳ Ｐゴシック" charset="-128"/>
+              </a:rPr>
+              <a:t>Plugin Architecture</a:t>
+            </a:r>
+            <a:endParaRPr lang="en-US" dirty="0" smtClean="0">
+              <a:ea typeface="ＭＳ Ｐゴシック" charset="-128"/>
+            </a:endParaRPr>
           </a:p>
         </p:txBody>
       </p:sp>
@@ -3867,7 +4066,7 @@
             <a:spLocks noGrp="1" noChangeArrowheads="1"/>
           </p:cNvSpPr>
           <p:nvPr>
-            <p:ph idx="1"/>
+            <p:ph type="body" idx="4294967295"/>
           </p:nvPr>
         </p:nvSpPr>
         <p:spPr/>
@@ -3875,97 +4074,85 @@
           <a:bodyPr/>
           <a:lstStyle/>
           <a:p>
-            <a:r>
-              <a:rPr lang="en-US" dirty="0" smtClean="0"/>
-              <a:t>Features</a:t>
-            </a:r>
-          </a:p>
-          <a:p>
-            <a:pPr lvl="1"/>
-            <a:r>
-              <a:rPr lang="en-US" dirty="0" smtClean="0"/>
-              <a:t>Allow storage of data files on the file system instead of the database.</a:t>
-            </a:r>
-          </a:p>
-          <a:p>
-            <a:pPr lvl="1"/>
-            <a:r>
-              <a:rPr lang="en-US" dirty="0" smtClean="0"/>
-              <a:t>Support future cloud storage of data files, allowing a local installer to configure this.</a:t>
-            </a:r>
-          </a:p>
-          <a:p>
-            <a:pPr lvl="1"/>
-            <a:r>
-              <a:rPr lang="en-US" dirty="0" smtClean="0"/>
-              <a:t>Prototype 2 options:</a:t>
-            </a:r>
-          </a:p>
-          <a:p>
-            <a:pPr lvl="2"/>
-            <a:r>
-              <a:rPr lang="en-US" dirty="0" smtClean="0"/>
-              <a:t>storage of parsed data on the file system (using </a:t>
-            </a:r>
-            <a:r>
-              <a:rPr lang="en-US" dirty="0" err="1" smtClean="0"/>
-              <a:t>NetCDF</a:t>
-            </a:r>
-            <a:r>
-              <a:rPr lang="en-US" dirty="0" smtClean="0"/>
-              <a:t> or similar)</a:t>
-            </a:r>
-          </a:p>
-          <a:p>
-            <a:pPr lvl="2"/>
-            <a:r>
-              <a:rPr lang="en-US" dirty="0" smtClean="0"/>
-              <a:t>storage of parsed data in a </a:t>
-            </a:r>
-            <a:r>
-              <a:rPr lang="en-US" dirty="0" err="1" smtClean="0"/>
-              <a:t>Postgres</a:t>
-            </a:r>
-            <a:r>
-              <a:rPr lang="en-US" dirty="0" smtClean="0"/>
-              <a:t> database</a:t>
-            </a:r>
-          </a:p>
-          <a:p>
-            <a:pPr lvl="2">
-              <a:buNone/>
-            </a:pPr>
-            <a:r>
-              <a:rPr lang="en-US" dirty="0" smtClean="0"/>
-              <a:t>A migration strategy for existing data will be needed.</a:t>
-            </a:r>
-          </a:p>
-          <a:p>
-            <a:pPr lvl="1"/>
-            <a:r>
-              <a:rPr lang="en-US" dirty="0" smtClean="0"/>
-              <a:t>Add better Import Queue management, including the ability to see the position of your import in the queue and the ability to cancel an import</a:t>
-            </a:r>
-            <a:r>
-              <a:rPr lang="en-US" dirty="0" smtClean="0"/>
-              <a:t>.</a:t>
-            </a:r>
-          </a:p>
-          <a:p>
-            <a:pPr lvl="1"/>
-            <a:r>
-              <a:rPr lang="en-US" dirty="0" smtClean="0"/>
-              <a:t>Evaluate option </a:t>
-            </a:r>
-            <a:r>
-              <a:rPr lang="en-US" smtClean="0"/>
-              <a:t>of turning </a:t>
-            </a:r>
-            <a:r>
-              <a:rPr lang="en-US" dirty="0" smtClean="0"/>
-              <a:t>off parsing.</a:t>
-            </a:r>
-            <a:endParaRPr lang="en-US" dirty="0" smtClean="0"/>
+            <a:pPr eaLnBrk="1" hangingPunct="1"/>
+            <a:r>
+              <a:rPr lang="en-US" sz="2400" dirty="0" smtClean="0"/>
+              <a:t>Introduce extension points that allow new functionality to be added to </a:t>
+            </a:r>
+            <a:r>
+              <a:rPr lang="en-US" sz="2400" dirty="0" err="1" smtClean="0"/>
+              <a:t>caArray</a:t>
+            </a:r>
+            <a:r>
+              <a:rPr lang="en-US" sz="2400" dirty="0" smtClean="0"/>
+              <a:t> without requiring a new application release</a:t>
+            </a:r>
+          </a:p>
+          <a:p>
+            <a:pPr eaLnBrk="1" hangingPunct="1"/>
+            <a:r>
+              <a:rPr lang="en-US" sz="2400" dirty="0" smtClean="0"/>
+              <a:t>Based on widely adopted </a:t>
+            </a:r>
+            <a:r>
+              <a:rPr lang="en-US" sz="2400" dirty="0" err="1" smtClean="0"/>
+              <a:t>OSGi</a:t>
+            </a:r>
+            <a:r>
+              <a:rPr lang="en-US" sz="2400" dirty="0" smtClean="0"/>
+              <a:t> industry standard, and leverages </a:t>
+            </a:r>
+            <a:r>
+              <a:rPr lang="en-US" sz="2400" dirty="0" err="1" smtClean="0"/>
+              <a:t>Atlassian’s</a:t>
+            </a:r>
+            <a:r>
+              <a:rPr lang="en-US" sz="2400" dirty="0" smtClean="0"/>
+              <a:t> (JIRA, Confluence) plugin framework</a:t>
+            </a:r>
+          </a:p>
+          <a:p>
+            <a:pPr eaLnBrk="1" hangingPunct="1"/>
+            <a:r>
+              <a:rPr lang="en-US" sz="2400" dirty="0" smtClean="0"/>
+              <a:t>Plugins can be hot-deployed into a running </a:t>
+            </a:r>
+            <a:r>
+              <a:rPr lang="en-US" sz="2400" dirty="0" err="1" smtClean="0"/>
+              <a:t>caArray</a:t>
+            </a:r>
+            <a:r>
+              <a:rPr lang="en-US" sz="2400" dirty="0" smtClean="0"/>
+              <a:t> instance and are instantly picked up and incorporated into the application</a:t>
+            </a:r>
+          </a:p>
+          <a:p>
+            <a:pPr eaLnBrk="1" hangingPunct="1"/>
+            <a:r>
+              <a:rPr lang="en-US" sz="2400" dirty="0" smtClean="0"/>
+              <a:t>Initial implementation (in 2.5.0) will have two extension points:</a:t>
+            </a:r>
+          </a:p>
+          <a:p>
+            <a:pPr lvl="1" eaLnBrk="1" hangingPunct="1"/>
+            <a:r>
+              <a:rPr lang="en-US" sz="1600" dirty="0" smtClean="0"/>
+              <a:t>Array Platform Support</a:t>
+            </a:r>
+          </a:p>
+          <a:p>
+            <a:pPr lvl="1" eaLnBrk="1" hangingPunct="1"/>
+            <a:r>
+              <a:rPr lang="en-US" sz="1600" dirty="0" smtClean="0"/>
+              <a:t>Data Storage Mechanism</a:t>
+            </a:r>
+          </a:p>
+          <a:p>
+            <a:pPr eaLnBrk="1" hangingPunct="1"/>
+            <a:r>
+              <a:rPr lang="en-US" sz="2400" dirty="0" smtClean="0"/>
+              <a:t>Future extension points could allow extending UI or API</a:t>
+            </a:r>
           </a:p>
         </p:txBody>
       </p:sp>
@@ -4008,7 +4195,7 @@
             <a:spLocks noGrp="1" noChangeArrowheads="1"/>
           </p:cNvSpPr>
           <p:nvPr>
-            <p:ph type="title"/>
+            <p:ph type="title" idx="4294967295"/>
           </p:nvPr>
         </p:nvSpPr>
         <p:spPr/>
@@ -4016,10 +4203,16 @@
           <a:bodyPr/>
           <a:lstStyle/>
           <a:p>
-            <a:r>
-              <a:rPr lang="en-US" dirty="0" smtClean="0"/>
-              <a:t>Upload/Download of large file sets</a:t>
-            </a:r>
+            <a:pPr eaLnBrk="1" hangingPunct="1"/>
+            <a:r>
+              <a:rPr lang="en-US" dirty="0" smtClean="0">
+                <a:ea typeface="ＭＳ Ｐゴシック" charset="-128"/>
+              </a:rPr>
+              <a:t>Array Platform Plugins</a:t>
+            </a:r>
+            <a:endParaRPr lang="en-US" dirty="0" smtClean="0">
+              <a:ea typeface="ＭＳ Ｐゴシック" charset="-128"/>
+            </a:endParaRPr>
           </a:p>
         </p:txBody>
       </p:sp>
@@ -4030,33 +4223,116 @@
             <a:spLocks noGrp="1" noChangeArrowheads="1"/>
           </p:cNvSpPr>
           <p:nvPr>
-            <p:ph idx="1"/>
-          </p:nvPr>
-        </p:nvSpPr>
-        <p:spPr/>
+            <p:ph type="body" idx="4294967295"/>
+          </p:nvPr>
+        </p:nvSpPr>
+        <p:spPr>
+          <a:xfrm>
+            <a:off x="1600200" y="1295400"/>
+            <a:ext cx="7391400" cy="5562600"/>
+          </a:xfrm>
+        </p:spPr>
         <p:txBody>
           <a:bodyPr/>
           <a:lstStyle/>
           <a:p>
-            <a:r>
-              <a:rPr lang="en-US" dirty="0" smtClean="0"/>
-              <a:t>Features</a:t>
-            </a:r>
-          </a:p>
-          <a:p>
-            <a:pPr lvl="1"/>
-            <a:r>
-              <a:rPr lang="en-US" dirty="0" smtClean="0"/>
-              <a:t>Implement an Upload/Download manager that eliminates the 2GB upload limit and allows </a:t>
-            </a:r>
-            <a:r>
-              <a:rPr lang="en-US" dirty="0" err="1" smtClean="0"/>
-              <a:t>resumable</a:t>
-            </a:r>
-            <a:r>
-              <a:rPr lang="en-US" dirty="0" smtClean="0"/>
-              <a:t> uploads and transparent compression.</a:t>
-            </a:r>
+            <a:pPr eaLnBrk="1" hangingPunct="1"/>
+            <a:r>
+              <a:rPr lang="en-US" sz="2400" dirty="0" smtClean="0"/>
+              <a:t>An array platform plugin provides support for import of design and data files for a particular microarray platform. This includes:</a:t>
+            </a:r>
+          </a:p>
+          <a:p>
+            <a:pPr lvl="1" eaLnBrk="1" hangingPunct="1"/>
+            <a:r>
+              <a:rPr lang="en-US" sz="1600" dirty="0" smtClean="0"/>
+              <a:t>Defining the file types associated with the platform</a:t>
+            </a:r>
+          </a:p>
+          <a:p>
+            <a:pPr lvl="1" eaLnBrk="1" hangingPunct="1"/>
+            <a:r>
+              <a:rPr lang="en-US" sz="1600" dirty="0" smtClean="0"/>
+              <a:t>Defining the </a:t>
+            </a:r>
+            <a:r>
+              <a:rPr lang="en-US" sz="1600" dirty="0" err="1" smtClean="0"/>
+              <a:t>quantitation</a:t>
+            </a:r>
+            <a:r>
+              <a:rPr lang="en-US" sz="1600" dirty="0" smtClean="0"/>
+              <a:t> types for the various designs for the platform</a:t>
+            </a:r>
+          </a:p>
+          <a:p>
+            <a:pPr lvl="1" eaLnBrk="1" hangingPunct="1"/>
+            <a:r>
+              <a:rPr lang="en-US" sz="1600" dirty="0" smtClean="0"/>
+              <a:t>Providing parsers for the various design file formats for the platform</a:t>
+            </a:r>
+          </a:p>
+          <a:p>
+            <a:pPr lvl="1" eaLnBrk="1" hangingPunct="1"/>
+            <a:r>
+              <a:rPr lang="en-US" sz="1600" dirty="0" smtClean="0"/>
+              <a:t>Providing parsers for the various data file formats for the platform</a:t>
+            </a:r>
+          </a:p>
+          <a:p>
+            <a:pPr eaLnBrk="1" hangingPunct="1"/>
+            <a:r>
+              <a:rPr lang="en-US" sz="2400" dirty="0" smtClean="0"/>
+              <a:t>A platform plugin can also add supported for new “imported, not parsed” design and data file formats</a:t>
+            </a:r>
+          </a:p>
+          <a:p>
+            <a:pPr eaLnBrk="1" hangingPunct="1"/>
+            <a:r>
+              <a:rPr lang="en-US" sz="2400" dirty="0" smtClean="0"/>
+              <a:t>Currently still limited to microarray-based assays (not next-gen or others), but may expand that in future (post 2.5.0)</a:t>
+            </a:r>
+          </a:p>
+          <a:p>
+            <a:pPr eaLnBrk="1" hangingPunct="1"/>
+            <a:r>
+              <a:rPr lang="en-US" sz="2400" dirty="0" smtClean="0"/>
+              <a:t>Goal is to minimize coupling of platform plugins to </a:t>
+            </a:r>
+            <a:r>
+              <a:rPr lang="en-US" sz="2400" dirty="0" err="1" smtClean="0"/>
+              <a:t>caArray</a:t>
+            </a:r>
+            <a:r>
+              <a:rPr lang="en-US" sz="2400" dirty="0" smtClean="0"/>
+              <a:t> to enable reuse in other applications</a:t>
+            </a:r>
+          </a:p>
+          <a:p>
+            <a:pPr eaLnBrk="1" hangingPunct="1"/>
+            <a:r>
+              <a:rPr lang="en-US" sz="2400" dirty="0" smtClean="0"/>
+              <a:t>Currently supported platforms will be extracted as plugins that are bundled with a standard </a:t>
+            </a:r>
+            <a:r>
+              <a:rPr lang="en-US" sz="2400" dirty="0" err="1" smtClean="0"/>
+              <a:t>caArray</a:t>
+            </a:r>
+            <a:r>
+              <a:rPr lang="en-US" sz="2400" dirty="0" smtClean="0"/>
+              <a:t> distribution</a:t>
+            </a:r>
+          </a:p>
+          <a:p>
+            <a:pPr eaLnBrk="1" hangingPunct="1"/>
+            <a:endParaRPr lang="en-US" sz="2400" dirty="0" smtClean="0"/>
+          </a:p>
+          <a:p>
+            <a:pPr lvl="1" eaLnBrk="1" hangingPunct="1"/>
+            <a:endParaRPr lang="en-US" sz="1600" dirty="0" smtClean="0"/>
+          </a:p>
+          <a:p>
+            <a:pPr lvl="1" eaLnBrk="1" hangingPunct="1"/>
+            <a:endParaRPr lang="en-US" sz="800" dirty="0" smtClean="0"/>
           </a:p>
         </p:txBody>
       </p:sp>
@@ -4076,6 +4352,529 @@
 </file>
 
 <file path=ppt/slides/slide5.xml><?xml version="1.0" encoding="utf-8"?>
+<p:sld xmlns:a="http://schemas.openxmlformats.org/drawingml/2006/main" xmlns:r="http://schemas.openxmlformats.org/officeDocument/2006/relationships" xmlns:mc="http://schemas.openxmlformats.org/markup-compatibility/2006" xmlns:mv="urn:schemas-microsoft-com:mac:vml" xmlns:p="http://schemas.openxmlformats.org/presentationml/2006/main" mc:Ignorable="mv" mc:PreserveAttributes="mv:*">
+  <p:cSld>
+    <p:spTree>
+      <p:nvGrpSpPr>
+        <p:cNvPr id="1" name=""/>
+        <p:cNvGrpSpPr/>
+        <p:nvPr/>
+      </p:nvGrpSpPr>
+      <p:grpSpPr>
+        <a:xfrm>
+          <a:off x="0" y="0"/>
+          <a:ext cx="0" cy="0"/>
+          <a:chOff x="0" y="0"/>
+          <a:chExt cx="0" cy="0"/>
+        </a:xfrm>
+      </p:grpSpPr>
+      <p:sp>
+        <p:nvSpPr>
+          <p:cNvPr id="100354" name="Rectangle 2"/>
+          <p:cNvSpPr>
+            <a:spLocks noGrp="1" noChangeArrowheads="1"/>
+          </p:cNvSpPr>
+          <p:nvPr>
+            <p:ph type="title" idx="4294967295"/>
+          </p:nvPr>
+        </p:nvSpPr>
+        <p:spPr/>
+        <p:txBody>
+          <a:bodyPr/>
+          <a:lstStyle/>
+          <a:p>
+            <a:pPr eaLnBrk="1" hangingPunct="1"/>
+            <a:r>
+              <a:rPr lang="en-US" dirty="0" smtClean="0">
+                <a:ea typeface="ＭＳ Ｐゴシック" charset="-128"/>
+              </a:rPr>
+              <a:t>Data Storage Engine Plugins</a:t>
+            </a:r>
+            <a:endParaRPr lang="en-US" dirty="0" smtClean="0">
+              <a:ea typeface="ＭＳ Ｐゴシック" charset="-128"/>
+            </a:endParaRPr>
+          </a:p>
+        </p:txBody>
+      </p:sp>
+      <p:sp>
+        <p:nvSpPr>
+          <p:cNvPr id="100355" name="Rectangle 3"/>
+          <p:cNvSpPr>
+            <a:spLocks noGrp="1" noChangeArrowheads="1"/>
+          </p:cNvSpPr>
+          <p:nvPr>
+            <p:ph type="body" idx="4294967295"/>
+          </p:nvPr>
+        </p:nvSpPr>
+        <p:spPr>
+          <a:xfrm>
+            <a:off x="1600200" y="1295400"/>
+            <a:ext cx="7391400" cy="5562600"/>
+          </a:xfrm>
+        </p:spPr>
+        <p:txBody>
+          <a:bodyPr/>
+          <a:lstStyle/>
+          <a:p>
+            <a:pPr eaLnBrk="1" hangingPunct="1"/>
+            <a:r>
+              <a:rPr lang="en-US" sz="2400" dirty="0" smtClean="0"/>
+              <a:t>A data storage engine plugin provides support for storing large blocks of data (“blobs”)</a:t>
+            </a:r>
+          </a:p>
+          <a:p>
+            <a:pPr eaLnBrk="1" hangingPunct="1"/>
+            <a:r>
+              <a:rPr lang="en-US" sz="2400" dirty="0" smtClean="0"/>
+              <a:t>Used in </a:t>
+            </a:r>
+            <a:r>
+              <a:rPr lang="en-US" sz="2400" dirty="0" err="1" smtClean="0"/>
+              <a:t>caArray</a:t>
+            </a:r>
+            <a:r>
+              <a:rPr lang="en-US" sz="2400" dirty="0" smtClean="0"/>
+              <a:t> to store both raw file data and parsed array data (serialized using some mechanism like </a:t>
+            </a:r>
+            <a:r>
+              <a:rPr lang="en-US" sz="2400" dirty="0" err="1" smtClean="0"/>
+              <a:t>NetCDF</a:t>
+            </a:r>
+            <a:r>
+              <a:rPr lang="en-US" sz="2400" dirty="0" smtClean="0"/>
+              <a:t> or Java Serialization)</a:t>
+            </a:r>
+          </a:p>
+          <a:p>
+            <a:pPr lvl="1" eaLnBrk="1" hangingPunct="1"/>
+            <a:r>
+              <a:rPr lang="en-US" sz="1600" dirty="0" smtClean="0"/>
+              <a:t>Can configure different storage engines for raw and parsed data</a:t>
+            </a:r>
+          </a:p>
+          <a:p>
+            <a:pPr lvl="1" eaLnBrk="1" hangingPunct="1"/>
+            <a:r>
+              <a:rPr lang="en-US" sz="1600" dirty="0" err="1" smtClean="0"/>
+              <a:t>caArray</a:t>
+            </a:r>
+            <a:r>
+              <a:rPr lang="en-US" sz="1600" dirty="0" smtClean="0"/>
+              <a:t> application now only stores handles for data blocks, and is thus completely decoupled from how the data is stored</a:t>
+            </a:r>
+          </a:p>
+          <a:p>
+            <a:pPr eaLnBrk="1" hangingPunct="1"/>
+            <a:r>
+              <a:rPr lang="en-US" sz="2400" dirty="0" err="1" smtClean="0"/>
+              <a:t>caArray</a:t>
+            </a:r>
+            <a:r>
+              <a:rPr lang="en-US" sz="2400" dirty="0" smtClean="0"/>
+              <a:t> will initially provide two storage engine plugins</a:t>
+            </a:r>
+          </a:p>
+          <a:p>
+            <a:pPr lvl="1" eaLnBrk="1" hangingPunct="1"/>
+            <a:r>
+              <a:rPr lang="en-US" sz="1600" dirty="0" err="1" smtClean="0"/>
+              <a:t>MySQL</a:t>
+            </a:r>
+            <a:r>
+              <a:rPr lang="en-US" sz="1600" dirty="0" smtClean="0"/>
+              <a:t> database-based storage (replicating current functionality)</a:t>
+            </a:r>
+          </a:p>
+          <a:p>
+            <a:pPr lvl="1" eaLnBrk="1" hangingPunct="1"/>
+            <a:r>
+              <a:rPr lang="en-US" sz="1600" dirty="0" err="1" smtClean="0"/>
+              <a:t>Filesystem</a:t>
+            </a:r>
+            <a:r>
+              <a:rPr lang="en-US" sz="1600" dirty="0" smtClean="0"/>
+              <a:t>-based storage</a:t>
+            </a:r>
+          </a:p>
+          <a:p>
+            <a:pPr eaLnBrk="1" hangingPunct="1"/>
+            <a:r>
+              <a:rPr lang="en-US" sz="2400" dirty="0" smtClean="0"/>
+              <a:t>Can be used to create other storage implementations, providing better scalability options</a:t>
+            </a:r>
+          </a:p>
+          <a:p>
+            <a:pPr lvl="1" eaLnBrk="1" hangingPunct="1"/>
+            <a:r>
+              <a:rPr lang="en-US" sz="1600" dirty="0" smtClean="0"/>
+              <a:t>Amazon S3 / Other Cloud, </a:t>
+            </a:r>
+            <a:r>
+              <a:rPr lang="en-US" sz="1600" dirty="0" err="1" smtClean="0"/>
+              <a:t>PostgreSql</a:t>
+            </a:r>
+            <a:r>
+              <a:rPr lang="en-US" sz="1600" dirty="0" smtClean="0"/>
+              <a:t>, </a:t>
+            </a:r>
+            <a:r>
+              <a:rPr lang="en-US" sz="1600" dirty="0" err="1" smtClean="0"/>
+              <a:t>HadoopDB</a:t>
+            </a:r>
+            <a:r>
+              <a:rPr lang="en-US" sz="1600" dirty="0" smtClean="0"/>
+              <a:t>, etc</a:t>
+            </a:r>
+          </a:p>
+          <a:p>
+            <a:pPr eaLnBrk="1" hangingPunct="1"/>
+            <a:r>
+              <a:rPr lang="en-US" sz="2400" dirty="0" smtClean="0"/>
+              <a:t>Again, goal is to minimize coupling to </a:t>
+            </a:r>
+            <a:r>
+              <a:rPr lang="en-US" sz="2400" dirty="0" err="1" smtClean="0"/>
+              <a:t>caArray</a:t>
+            </a:r>
+            <a:r>
+              <a:rPr lang="en-US" sz="2400" dirty="0" smtClean="0"/>
+              <a:t> for max reuse</a:t>
+            </a:r>
+          </a:p>
+          <a:p>
+            <a:pPr eaLnBrk="1" hangingPunct="1"/>
+            <a:endParaRPr lang="en-US" sz="2400" dirty="0" smtClean="0"/>
+          </a:p>
+          <a:p>
+            <a:pPr lvl="1" eaLnBrk="1" hangingPunct="1"/>
+            <a:endParaRPr lang="en-US" sz="1600" dirty="0" smtClean="0"/>
+          </a:p>
+          <a:p>
+            <a:pPr lvl="1" eaLnBrk="1" hangingPunct="1"/>
+            <a:endParaRPr lang="en-US" sz="800" dirty="0" smtClean="0"/>
+          </a:p>
+        </p:txBody>
+      </p:sp>
+    </p:spTree>
+  </p:cSld>
+  <p:clrMapOvr>
+    <a:masterClrMapping/>
+  </p:clrMapOvr>
+  <p:timing>
+    <p:tnLst>
+      <p:par>
+        <p:cTn id="1" dur="indefinite" restart="never" nodeType="tmRoot"/>
+      </p:par>
+    </p:tnLst>
+  </p:timing>
+</p:sld>
+</file>
+
+<file path=ppt/slides/slide6.xml><?xml version="1.0" encoding="utf-8"?>
+<p:sld xmlns:a="http://schemas.openxmlformats.org/drawingml/2006/main" xmlns:r="http://schemas.openxmlformats.org/officeDocument/2006/relationships" xmlns:mc="http://schemas.openxmlformats.org/markup-compatibility/2006" xmlns:mv="urn:schemas-microsoft-com:mac:vml" xmlns:p="http://schemas.openxmlformats.org/presentationml/2006/main" mc:Ignorable="mv" mc:PreserveAttributes="mv:*">
+  <p:cSld>
+    <p:spTree>
+      <p:nvGrpSpPr>
+        <p:cNvPr id="1" name=""/>
+        <p:cNvGrpSpPr/>
+        <p:nvPr/>
+      </p:nvGrpSpPr>
+      <p:grpSpPr>
+        <a:xfrm>
+          <a:off x="0" y="0"/>
+          <a:ext cx="0" cy="0"/>
+          <a:chOff x="0" y="0"/>
+          <a:chExt cx="0" cy="0"/>
+        </a:xfrm>
+      </p:grpSpPr>
+      <p:sp>
+        <p:nvSpPr>
+          <p:cNvPr id="3" name="TextBox 2"/>
+          <p:cNvSpPr txBox="1"/>
+          <p:nvPr/>
+        </p:nvSpPr>
+        <p:spPr>
+          <a:xfrm>
+            <a:off x="3505200" y="3505200"/>
+            <a:ext cx="2958976" cy="1107996"/>
+          </a:xfrm>
+          <a:prstGeom prst="rect">
+            <a:avLst/>
+          </a:prstGeom>
+          <a:noFill/>
+        </p:spPr>
+        <p:txBody>
+          <a:bodyPr wrap="none" rtlCol="0">
+            <a:spAutoFit/>
+          </a:bodyPr>
+          <a:lstStyle/>
+          <a:p>
+            <a:r>
+              <a:rPr lang="en-US" sz="6600" dirty="0" smtClean="0"/>
+              <a:t>DEMO!</a:t>
+            </a:r>
+            <a:endParaRPr lang="en-US" sz="6600" dirty="0"/>
+          </a:p>
+        </p:txBody>
+      </p:sp>
+    </p:spTree>
+  </p:cSld>
+  <p:clrMapOvr>
+    <a:masterClrMapping/>
+  </p:clrMapOvr>
+</p:sld>
+</file>
+
+<file path=ppt/slides/slide7.xml><?xml version="1.0" encoding="utf-8"?>
+<p:sld xmlns:a="http://schemas.openxmlformats.org/drawingml/2006/main" xmlns:r="http://schemas.openxmlformats.org/officeDocument/2006/relationships" xmlns:mc="http://schemas.openxmlformats.org/markup-compatibility/2006" xmlns:mv="urn:schemas-microsoft-com:mac:vml" xmlns:p="http://schemas.openxmlformats.org/presentationml/2006/main" mc:Ignorable="mv" mc:PreserveAttributes="mv:*">
+  <p:cSld>
+    <p:spTree>
+      <p:nvGrpSpPr>
+        <p:cNvPr id="1" name=""/>
+        <p:cNvGrpSpPr/>
+        <p:nvPr/>
+      </p:nvGrpSpPr>
+      <p:grpSpPr>
+        <a:xfrm>
+          <a:off x="0" y="0"/>
+          <a:ext cx="0" cy="0"/>
+          <a:chOff x="0" y="0"/>
+          <a:chExt cx="0" cy="0"/>
+        </a:xfrm>
+      </p:grpSpPr>
+      <p:sp>
+        <p:nvSpPr>
+          <p:cNvPr id="100354" name="Rectangle 2"/>
+          <p:cNvSpPr>
+            <a:spLocks noGrp="1" noChangeArrowheads="1"/>
+          </p:cNvSpPr>
+          <p:nvPr>
+            <p:ph type="title"/>
+          </p:nvPr>
+        </p:nvSpPr>
+        <p:spPr/>
+        <p:txBody>
+          <a:bodyPr/>
+          <a:lstStyle/>
+          <a:p>
+            <a:r>
+              <a:rPr lang="en-US" dirty="0" smtClean="0"/>
+              <a:t>Import of large data sets</a:t>
+            </a:r>
+          </a:p>
+        </p:txBody>
+      </p:sp>
+      <p:sp>
+        <p:nvSpPr>
+          <p:cNvPr id="100355" name="Rectangle 3"/>
+          <p:cNvSpPr>
+            <a:spLocks noGrp="1" noChangeArrowheads="1"/>
+          </p:cNvSpPr>
+          <p:nvPr>
+            <p:ph idx="1"/>
+          </p:nvPr>
+        </p:nvSpPr>
+        <p:spPr/>
+        <p:txBody>
+          <a:bodyPr/>
+          <a:lstStyle/>
+          <a:p>
+            <a:r>
+              <a:rPr lang="en-US" dirty="0" smtClean="0"/>
+              <a:t>Features</a:t>
+            </a:r>
+          </a:p>
+          <a:p>
+            <a:pPr lvl="1"/>
+            <a:r>
+              <a:rPr lang="en-US" dirty="0" smtClean="0"/>
+              <a:t>Allow storage of data files on the file system instead of the database.</a:t>
+            </a:r>
+          </a:p>
+          <a:p>
+            <a:pPr lvl="1"/>
+            <a:r>
+              <a:rPr lang="en-US" dirty="0" smtClean="0"/>
+              <a:t>Support future cloud storage of data files, allowing a local installer to configure this.</a:t>
+            </a:r>
+          </a:p>
+          <a:p>
+            <a:pPr lvl="1"/>
+            <a:r>
+              <a:rPr lang="en-US" dirty="0" smtClean="0"/>
+              <a:t>Prototype 2 options:</a:t>
+            </a:r>
+          </a:p>
+          <a:p>
+            <a:pPr lvl="2"/>
+            <a:r>
+              <a:rPr lang="en-US" dirty="0" smtClean="0"/>
+              <a:t>storage of parsed data on the file system (using </a:t>
+            </a:r>
+            <a:r>
+              <a:rPr lang="en-US" dirty="0" err="1" smtClean="0"/>
+              <a:t>NetCDF</a:t>
+            </a:r>
+            <a:r>
+              <a:rPr lang="en-US" dirty="0" smtClean="0"/>
+              <a:t> or similar)</a:t>
+            </a:r>
+          </a:p>
+          <a:p>
+            <a:pPr lvl="2"/>
+            <a:r>
+              <a:rPr lang="en-US" dirty="0" smtClean="0"/>
+              <a:t>storage of parsed data in a </a:t>
+            </a:r>
+            <a:r>
+              <a:rPr lang="en-US" dirty="0" err="1" smtClean="0"/>
+              <a:t>Postgres</a:t>
+            </a:r>
+            <a:r>
+              <a:rPr lang="en-US" dirty="0" smtClean="0"/>
+              <a:t> database</a:t>
+            </a:r>
+          </a:p>
+          <a:p>
+            <a:pPr lvl="2">
+              <a:buNone/>
+            </a:pPr>
+            <a:r>
+              <a:rPr lang="en-US" dirty="0" smtClean="0"/>
+              <a:t>A migration strategy for existing data will be needed.</a:t>
+            </a:r>
+          </a:p>
+          <a:p>
+            <a:pPr lvl="1"/>
+            <a:r>
+              <a:rPr lang="en-US" dirty="0" smtClean="0"/>
+              <a:t>Add better Import Queue management, including the ability to see the position of your import in the queue and the ability to cancel an import.</a:t>
+            </a:r>
+          </a:p>
+          <a:p>
+            <a:pPr lvl="1"/>
+            <a:r>
+              <a:rPr lang="en-US" dirty="0" smtClean="0"/>
+              <a:t>Evaluate option </a:t>
+            </a:r>
+            <a:r>
+              <a:rPr lang="en-US" smtClean="0"/>
+              <a:t>of turning </a:t>
+            </a:r>
+            <a:r>
+              <a:rPr lang="en-US" dirty="0" smtClean="0"/>
+              <a:t>off parsing.</a:t>
+            </a:r>
+          </a:p>
+        </p:txBody>
+      </p:sp>
+    </p:spTree>
+  </p:cSld>
+  <p:clrMapOvr>
+    <a:masterClrMapping/>
+  </p:clrMapOvr>
+  <p:timing>
+    <p:tnLst>
+      <p:par>
+        <p:cTn id="1" dur="indefinite" restart="never" nodeType="tmRoot"/>
+      </p:par>
+    </p:tnLst>
+  </p:timing>
+</p:sld>
+</file>
+
+<file path=ppt/slides/slide8.xml><?xml version="1.0" encoding="utf-8"?>
+<p:sld xmlns:a="http://schemas.openxmlformats.org/drawingml/2006/main" xmlns:r="http://schemas.openxmlformats.org/officeDocument/2006/relationships" xmlns:mc="http://schemas.openxmlformats.org/markup-compatibility/2006" xmlns:mv="urn:schemas-microsoft-com:mac:vml" xmlns:p="http://schemas.openxmlformats.org/presentationml/2006/main" mc:Ignorable="mv" mc:PreserveAttributes="mv:*">
+  <p:cSld>
+    <p:spTree>
+      <p:nvGrpSpPr>
+        <p:cNvPr id="1" name=""/>
+        <p:cNvGrpSpPr/>
+        <p:nvPr/>
+      </p:nvGrpSpPr>
+      <p:grpSpPr>
+        <a:xfrm>
+          <a:off x="0" y="0"/>
+          <a:ext cx="0" cy="0"/>
+          <a:chOff x="0" y="0"/>
+          <a:chExt cx="0" cy="0"/>
+        </a:xfrm>
+      </p:grpSpPr>
+      <p:sp>
+        <p:nvSpPr>
+          <p:cNvPr id="100354" name="Rectangle 2"/>
+          <p:cNvSpPr>
+            <a:spLocks noGrp="1" noChangeArrowheads="1"/>
+          </p:cNvSpPr>
+          <p:nvPr>
+            <p:ph type="title"/>
+          </p:nvPr>
+        </p:nvSpPr>
+        <p:spPr/>
+        <p:txBody>
+          <a:bodyPr/>
+          <a:lstStyle/>
+          <a:p>
+            <a:r>
+              <a:rPr lang="en-US" dirty="0" smtClean="0"/>
+              <a:t>Upload/Download of large file sets</a:t>
+            </a:r>
+          </a:p>
+        </p:txBody>
+      </p:sp>
+      <p:sp>
+        <p:nvSpPr>
+          <p:cNvPr id="100355" name="Rectangle 3"/>
+          <p:cNvSpPr>
+            <a:spLocks noGrp="1" noChangeArrowheads="1"/>
+          </p:cNvSpPr>
+          <p:nvPr>
+            <p:ph idx="1"/>
+          </p:nvPr>
+        </p:nvSpPr>
+        <p:spPr/>
+        <p:txBody>
+          <a:bodyPr/>
+          <a:lstStyle/>
+          <a:p>
+            <a:r>
+              <a:rPr lang="en-US" dirty="0" smtClean="0"/>
+              <a:t>Features</a:t>
+            </a:r>
+          </a:p>
+          <a:p>
+            <a:pPr lvl="1"/>
+            <a:r>
+              <a:rPr lang="en-US" dirty="0" smtClean="0"/>
+              <a:t>Implement an Upload/Download manager that eliminates the 2GB upload limit and allows </a:t>
+            </a:r>
+            <a:r>
+              <a:rPr lang="en-US" dirty="0" err="1" smtClean="0"/>
+              <a:t>resumable</a:t>
+            </a:r>
+            <a:r>
+              <a:rPr lang="en-US" dirty="0" smtClean="0"/>
+              <a:t> uploads and transparent compression.</a:t>
+            </a:r>
+          </a:p>
+        </p:txBody>
+      </p:sp>
+    </p:spTree>
+  </p:cSld>
+  <p:clrMapOvr>
+    <a:masterClrMapping/>
+  </p:clrMapOvr>
+  <p:timing>
+    <p:tnLst>
+      <p:par>
+        <p:cTn id="1" dur="indefinite" restart="never" nodeType="tmRoot"/>
+      </p:par>
+    </p:tnLst>
+  </p:timing>
+</p:sld>
+</file>
+
+<file path=ppt/slides/slide9.xml><?xml version="1.0" encoding="utf-8"?>
 <p:sld xmlns:a="http://schemas.openxmlformats.org/drawingml/2006/main" xmlns:r="http://schemas.openxmlformats.org/officeDocument/2006/relationships" xmlns:mc="http://schemas.openxmlformats.org/markup-compatibility/2006" xmlns:mv="urn:schemas-microsoft-com:mac:vml" xmlns:p="http://schemas.openxmlformats.org/presentationml/2006/main" mc:Ignorable="mv" mc:PreserveAttributes="mv:*">
   <p:cSld>
     <p:spTree>

</xml_diff>

<commit_message>
Removed redundancy in slide 7.
</commit_message>
<xml_diff>
--- a/project_management/open_meetings/ICR_WS_Meeting_2011_02_09.pptx
+++ b/project_management/open_meetings/ICR_WS_Meeting_2011_02_09.pptx
@@ -4053,9 +4053,6 @@
               </a:rPr>
               <a:t>Plugin Architecture</a:t>
             </a:r>
-            <a:endParaRPr lang="en-US" dirty="0" smtClean="0">
-              <a:ea typeface="ＭＳ Ｐゴシック" charset="-128"/>
-            </a:endParaRPr>
           </a:p>
         </p:txBody>
       </p:sp>
@@ -4210,9 +4207,6 @@
               </a:rPr>
               <a:t>Array Platform Plugins</a:t>
             </a:r>
-            <a:endParaRPr lang="en-US" dirty="0" smtClean="0">
-              <a:ea typeface="ＭＳ Ｐゴシック" charset="-128"/>
-            </a:endParaRPr>
           </a:p>
         </p:txBody>
       </p:sp>
@@ -4390,9 +4384,6 @@
               </a:rPr>
               <a:t>Data Storage Engine Plugins</a:t>
             </a:r>
-            <a:endParaRPr lang="en-US" dirty="0" smtClean="0">
-              <a:ea typeface="ＭＳ Ｐゴシック" charset="-128"/>
-            </a:endParaRPr>
           </a:p>
         </p:txBody>
       </p:sp>
@@ -4659,8 +4650,9 @@
           <a:p>
             <a:r>
               <a:rPr lang="en-US" dirty="0" smtClean="0"/>
-              <a:t>Import of large data sets</a:t>
-            </a:r>
+              <a:t>Other Import features</a:t>
+            </a:r>
+            <a:endParaRPr lang="en-US" dirty="0" smtClean="0"/>
           </a:p>
         </p:txBody>
       </p:sp>
@@ -4679,91 +4671,21 @@
           <a:bodyPr/>
           <a:lstStyle/>
           <a:p>
+            <a:pPr lvl="1"/>
             <a:r>
               <a:rPr lang="en-US" dirty="0" smtClean="0"/>
-              <a:t>Features</a:t>
+              <a:t>Add </a:t>
+            </a:r>
+            <a:r>
+              <a:rPr lang="en-US" dirty="0" smtClean="0"/>
+              <a:t>better Import Queue management, including the ability to see the position of your import in the queue and the ability to cancel an import.</a:t>
             </a:r>
           </a:p>
           <a:p>
             <a:pPr lvl="1"/>
             <a:r>
               <a:rPr lang="en-US" dirty="0" smtClean="0"/>
-              <a:t>Allow storage of data files on the file system instead of the database.</a:t>
-            </a:r>
-          </a:p>
-          <a:p>
-            <a:pPr lvl="1"/>
-            <a:r>
-              <a:rPr lang="en-US" dirty="0" smtClean="0"/>
-              <a:t>Support future cloud storage of data files, allowing a local installer to configure this.</a:t>
-            </a:r>
-          </a:p>
-          <a:p>
-            <a:pPr lvl="1"/>
-            <a:r>
-              <a:rPr lang="en-US" dirty="0" smtClean="0"/>
-              <a:t>Prototype 2 options:</a:t>
-            </a:r>
-          </a:p>
-          <a:p>
-            <a:pPr lvl="2"/>
-            <a:r>
-              <a:rPr lang="en-US" dirty="0" smtClean="0"/>
-              <a:t>storage of parsed data on the file system (using </a:t>
-            </a:r>
-            <a:r>
-              <a:rPr lang="en-US" dirty="0" err="1" smtClean="0"/>
-              <a:t>NetCDF</a:t>
-            </a:r>
-            <a:r>
-              <a:rPr lang="en-US" dirty="0" smtClean="0"/>
-              <a:t> or similar)</a:t>
-            </a:r>
-          </a:p>
-          <a:p>
-            <a:pPr lvl="2"/>
-            <a:r>
-              <a:rPr lang="en-US" dirty="0" smtClean="0"/>
-              <a:t>storage of parsed data in a </a:t>
-            </a:r>
-            <a:r>
-              <a:rPr lang="en-US" dirty="0" err="1" smtClean="0"/>
-              <a:t>Postgres</a:t>
-            </a:r>
-            <a:r>
-              <a:rPr lang="en-US" dirty="0" smtClean="0"/>
-              <a:t> database</a:t>
-            </a:r>
-          </a:p>
-          <a:p>
-            <a:pPr lvl="2">
-              <a:buNone/>
-            </a:pPr>
-            <a:r>
-              <a:rPr lang="en-US" dirty="0" smtClean="0"/>
-              <a:t>A migration strategy for existing data will be needed.</a:t>
-            </a:r>
-          </a:p>
-          <a:p>
-            <a:pPr lvl="1"/>
-            <a:r>
-              <a:rPr lang="en-US" dirty="0" smtClean="0"/>
-              <a:t>Add better Import Queue management, including the ability to see the position of your import in the queue and the ability to cancel an import.</a:t>
-            </a:r>
-          </a:p>
-          <a:p>
-            <a:pPr lvl="1"/>
-            <a:r>
-              <a:rPr lang="en-US" dirty="0" smtClean="0"/>
-              <a:t>Evaluate option </a:t>
-            </a:r>
-            <a:r>
-              <a:rPr lang="en-US" smtClean="0"/>
-              <a:t>of turning </a:t>
-            </a:r>
-            <a:r>
-              <a:rPr lang="en-US" dirty="0" smtClean="0"/>
-              <a:t>off parsing.</a:t>
+              <a:t>Evaluate option of turning off parsing.</a:t>
             </a:r>
           </a:p>
         </p:txBody>
@@ -4837,16 +4759,14 @@
           <a:bodyPr/>
           <a:lstStyle/>
           <a:p>
+            <a:pPr lvl="1"/>
+            <a:r>
+              <a:rPr lang="en-US" smtClean="0"/>
+              <a:t>Implement </a:t>
+            </a:r>
             <a:r>
               <a:rPr lang="en-US" dirty="0" smtClean="0"/>
-              <a:t>Features</a:t>
-            </a:r>
-          </a:p>
-          <a:p>
-            <a:pPr lvl="1"/>
-            <a:r>
-              <a:rPr lang="en-US" dirty="0" smtClean="0"/>
-              <a:t>Implement an Upload/Download manager that eliminates the 2GB upload limit and allows </a:t>
+              <a:t>an Upload/Download manager that eliminates the 2GB upload limit and allows </a:t>
             </a:r>
             <a:r>
               <a:rPr lang="en-US" dirty="0" err="1" smtClean="0"/>

</xml_diff>